<commit_message>
Correção dos Títulos das Aulas
</commit_message>
<xml_diff>
--- a/apresentacoes/Aula1/Etapa1-Apresentacao/Etapa1.pptx
+++ b/apresentacoes/Aula1/Etapa1-Apresentacao/Etapa1.pptx
@@ -299,7 +299,7 @@
       </p15:sldGuideLst>
     </p:ext>
     <p:ext uri="http://customooxmlschemas.google.com/">
-      <go:slidesCustomData xmlns:go="http://customooxmlschemas.google.com/" xmlns:ahyp="http://schemas.microsoft.com/office/drawing/2018/hyperlinkcolor" xmlns:p15="http://schemas.microsoft.com/office/powerpoint/2012/main" xmlns:p14="http://schemas.microsoft.com/office/powerpoint/2010/main" xmlns:com="http://schemas.openxmlformats.org/drawingml/2006/compatibility" xmlns:pvml="urn:schemas-microsoft-com:office:powerpoint" xmlns:v="urn:schemas-microsoft-com:vml" xmlns:o="urn:schemas-microsoft-com:office:office" xmlns:dgm="http://schemas.openxmlformats.org/drawingml/2006/diagram" xmlns:c="http://schemas.openxmlformats.org/drawingml/2006/chart" xmlns:mv="urn:schemas-microsoft-com:mac:vml" xmlns:mc="http://schemas.openxmlformats.org/markup-compatibility/2006" xmlns="" r:id="rId35" roundtripDataSignature="AMtx7mij1fsZUe5V3lBG5qQcqOvrI5UhJw=="/>
+      <go:slidesCustomData xmlns="" xmlns:mc="http://schemas.openxmlformats.org/markup-compatibility/2006" xmlns:mv="urn:schemas-microsoft-com:mac:vml" xmlns:c="http://schemas.openxmlformats.org/drawingml/2006/chart" xmlns:dgm="http://schemas.openxmlformats.org/drawingml/2006/diagram" xmlns:o="urn:schemas-microsoft-com:office:office" xmlns:v="urn:schemas-microsoft-com:vml" xmlns:pvml="urn:schemas-microsoft-com:office:powerpoint" xmlns:com="http://schemas.openxmlformats.org/drawingml/2006/compatibility" xmlns:p14="http://schemas.microsoft.com/office/powerpoint/2010/main" xmlns:p15="http://schemas.microsoft.com/office/powerpoint/2012/main" xmlns:ahyp="http://schemas.microsoft.com/office/drawing/2018/hyperlinkcolor" xmlns:go="http://customooxmlschemas.google.com/" r:id="rId35" roundtripDataSignature="AMtx7mij1fsZUe5V3lBG5qQcqOvrI5UhJw=="/>
     </p:ext>
   </p:extLst>
 </p:presentation>
@@ -22434,7 +22434,7 @@
         <p:fade/>
       </p:transition>
     </mc:Choice>
-    <mc:Fallback xmlns:ahyp="http://schemas.microsoft.com/office/drawing/2018/hyperlinkcolor" xmlns:p15="http://schemas.microsoft.com/office/powerpoint/2012/main" xmlns:com="http://schemas.openxmlformats.org/drawingml/2006/compatibility" xmlns:pvml="urn:schemas-microsoft-com:office:powerpoint" xmlns:v="urn:schemas-microsoft-com:vml" xmlns:o="urn:schemas-microsoft-com:office:office" xmlns:dgm="http://schemas.openxmlformats.org/drawingml/2006/diagram" xmlns:c="http://schemas.openxmlformats.org/drawingml/2006/chart" xmlns:mv="urn:schemas-microsoft-com:mac:vml" xmlns="">
+    <mc:Fallback xmlns="" xmlns:mv="urn:schemas-microsoft-com:mac:vml" xmlns:c="http://schemas.openxmlformats.org/drawingml/2006/chart" xmlns:dgm="http://schemas.openxmlformats.org/drawingml/2006/diagram" xmlns:o="urn:schemas-microsoft-com:office:office" xmlns:v="urn:schemas-microsoft-com:vml" xmlns:pvml="urn:schemas-microsoft-com:office:powerpoint" xmlns:com="http://schemas.openxmlformats.org/drawingml/2006/compatibility" xmlns:p15="http://schemas.microsoft.com/office/powerpoint/2012/main" xmlns:ahyp="http://schemas.microsoft.com/office/drawing/2018/hyperlinkcolor">
       <p:transition spd="slow">
         <p:fade/>
       </p:transition>
@@ -22754,7 +22754,7 @@
         <p:fade/>
       </p:transition>
     </mc:Choice>
-    <mc:Fallback xmlns:ahyp="http://schemas.microsoft.com/office/drawing/2018/hyperlinkcolor" xmlns:p15="http://schemas.microsoft.com/office/powerpoint/2012/main" xmlns:com="http://schemas.openxmlformats.org/drawingml/2006/compatibility" xmlns:pvml="urn:schemas-microsoft-com:office:powerpoint" xmlns:v="urn:schemas-microsoft-com:vml" xmlns:o="urn:schemas-microsoft-com:office:office" xmlns:dgm="http://schemas.openxmlformats.org/drawingml/2006/diagram" xmlns:c="http://schemas.openxmlformats.org/drawingml/2006/chart" xmlns:mv="urn:schemas-microsoft-com:mac:vml" xmlns="">
+    <mc:Fallback xmlns="" xmlns:mv="urn:schemas-microsoft-com:mac:vml" xmlns:c="http://schemas.openxmlformats.org/drawingml/2006/chart" xmlns:dgm="http://schemas.openxmlformats.org/drawingml/2006/diagram" xmlns:o="urn:schemas-microsoft-com:office:office" xmlns:v="urn:schemas-microsoft-com:vml" xmlns:pvml="urn:schemas-microsoft-com:office:powerpoint" xmlns:com="http://schemas.openxmlformats.org/drawingml/2006/compatibility" xmlns:p15="http://schemas.microsoft.com/office/powerpoint/2012/main" xmlns:ahyp="http://schemas.microsoft.com/office/drawing/2018/hyperlinkcolor">
       <p:transition spd="slow">
         <p:fade/>
       </p:transition>
@@ -23162,7 +23162,7 @@
         <p:fade/>
       </p:transition>
     </mc:Choice>
-    <mc:Fallback xmlns:ahyp="http://schemas.microsoft.com/office/drawing/2018/hyperlinkcolor" xmlns:p15="http://schemas.microsoft.com/office/powerpoint/2012/main" xmlns:com="http://schemas.openxmlformats.org/drawingml/2006/compatibility" xmlns:pvml="urn:schemas-microsoft-com:office:powerpoint" xmlns:v="urn:schemas-microsoft-com:vml" xmlns:o="urn:schemas-microsoft-com:office:office" xmlns:dgm="http://schemas.openxmlformats.org/drawingml/2006/diagram" xmlns:c="http://schemas.openxmlformats.org/drawingml/2006/chart" xmlns:mv="urn:schemas-microsoft-com:mac:vml" xmlns="">
+    <mc:Fallback xmlns="" xmlns:mv="urn:schemas-microsoft-com:mac:vml" xmlns:c="http://schemas.openxmlformats.org/drawingml/2006/chart" xmlns:dgm="http://schemas.openxmlformats.org/drawingml/2006/diagram" xmlns:o="urn:schemas-microsoft-com:office:office" xmlns:v="urn:schemas-microsoft-com:vml" xmlns:pvml="urn:schemas-microsoft-com:office:powerpoint" xmlns:com="http://schemas.openxmlformats.org/drawingml/2006/compatibility" xmlns:p15="http://schemas.microsoft.com/office/powerpoint/2012/main" xmlns:ahyp="http://schemas.microsoft.com/office/drawing/2018/hyperlinkcolor">
       <p:transition spd="slow">
         <p:fade/>
       </p:transition>
@@ -23590,7 +23590,7 @@
         <p:fade/>
       </p:transition>
     </mc:Choice>
-    <mc:Fallback xmlns:ahyp="http://schemas.microsoft.com/office/drawing/2018/hyperlinkcolor" xmlns:p15="http://schemas.microsoft.com/office/powerpoint/2012/main" xmlns:com="http://schemas.openxmlformats.org/drawingml/2006/compatibility" xmlns:pvml="urn:schemas-microsoft-com:office:powerpoint" xmlns:v="urn:schemas-microsoft-com:vml" xmlns:o="urn:schemas-microsoft-com:office:office" xmlns:dgm="http://schemas.openxmlformats.org/drawingml/2006/diagram" xmlns:c="http://schemas.openxmlformats.org/drawingml/2006/chart" xmlns:mv="urn:schemas-microsoft-com:mac:vml" xmlns="">
+    <mc:Fallback xmlns="" xmlns:mv="urn:schemas-microsoft-com:mac:vml" xmlns:c="http://schemas.openxmlformats.org/drawingml/2006/chart" xmlns:dgm="http://schemas.openxmlformats.org/drawingml/2006/diagram" xmlns:o="urn:schemas-microsoft-com:office:office" xmlns:v="urn:schemas-microsoft-com:vml" xmlns:pvml="urn:schemas-microsoft-com:office:powerpoint" xmlns:com="http://schemas.openxmlformats.org/drawingml/2006/compatibility" xmlns:p15="http://schemas.microsoft.com/office/powerpoint/2012/main" xmlns:ahyp="http://schemas.microsoft.com/office/drawing/2018/hyperlinkcolor">
       <p:transition spd="slow">
         <p:fade/>
       </p:transition>
@@ -23965,7 +23965,7 @@
         <p:fade/>
       </p:transition>
     </mc:Choice>
-    <mc:Fallback xmlns:ahyp="http://schemas.microsoft.com/office/drawing/2018/hyperlinkcolor" xmlns:p15="http://schemas.microsoft.com/office/powerpoint/2012/main" xmlns:com="http://schemas.openxmlformats.org/drawingml/2006/compatibility" xmlns:pvml="urn:schemas-microsoft-com:office:powerpoint" xmlns:v="urn:schemas-microsoft-com:vml" xmlns:o="urn:schemas-microsoft-com:office:office" xmlns:dgm="http://schemas.openxmlformats.org/drawingml/2006/diagram" xmlns:c="http://schemas.openxmlformats.org/drawingml/2006/chart" xmlns:mv="urn:schemas-microsoft-com:mac:vml" xmlns="">
+    <mc:Fallback xmlns="" xmlns:mv="urn:schemas-microsoft-com:mac:vml" xmlns:c="http://schemas.openxmlformats.org/drawingml/2006/chart" xmlns:dgm="http://schemas.openxmlformats.org/drawingml/2006/diagram" xmlns:o="urn:schemas-microsoft-com:office:office" xmlns:v="urn:schemas-microsoft-com:vml" xmlns:pvml="urn:schemas-microsoft-com:office:powerpoint" xmlns:com="http://schemas.openxmlformats.org/drawingml/2006/compatibility" xmlns:p15="http://schemas.microsoft.com/office/powerpoint/2012/main" xmlns:ahyp="http://schemas.microsoft.com/office/drawing/2018/hyperlinkcolor">
       <p:transition spd="slow">
         <p:fade/>
       </p:transition>
@@ -24340,7 +24340,7 @@
         <p:fade/>
       </p:transition>
     </mc:Choice>
-    <mc:Fallback xmlns:ahyp="http://schemas.microsoft.com/office/drawing/2018/hyperlinkcolor" xmlns:p15="http://schemas.microsoft.com/office/powerpoint/2012/main" xmlns:com="http://schemas.openxmlformats.org/drawingml/2006/compatibility" xmlns:pvml="urn:schemas-microsoft-com:office:powerpoint" xmlns:v="urn:schemas-microsoft-com:vml" xmlns:o="urn:schemas-microsoft-com:office:office" xmlns:dgm="http://schemas.openxmlformats.org/drawingml/2006/diagram" xmlns:c="http://schemas.openxmlformats.org/drawingml/2006/chart" xmlns:mv="urn:schemas-microsoft-com:mac:vml" xmlns="">
+    <mc:Fallback xmlns="" xmlns:mv="urn:schemas-microsoft-com:mac:vml" xmlns:c="http://schemas.openxmlformats.org/drawingml/2006/chart" xmlns:dgm="http://schemas.openxmlformats.org/drawingml/2006/diagram" xmlns:o="urn:schemas-microsoft-com:office:office" xmlns:v="urn:schemas-microsoft-com:vml" xmlns:pvml="urn:schemas-microsoft-com:office:powerpoint" xmlns:com="http://schemas.openxmlformats.org/drawingml/2006/compatibility" xmlns:p15="http://schemas.microsoft.com/office/powerpoint/2012/main" xmlns:ahyp="http://schemas.microsoft.com/office/drawing/2018/hyperlinkcolor">
       <p:transition spd="slow">
         <p:fade/>
       </p:transition>
@@ -24715,7 +24715,7 @@
         <p:fade/>
       </p:transition>
     </mc:Choice>
-    <mc:Fallback xmlns:ahyp="http://schemas.microsoft.com/office/drawing/2018/hyperlinkcolor" xmlns:p15="http://schemas.microsoft.com/office/powerpoint/2012/main" xmlns:com="http://schemas.openxmlformats.org/drawingml/2006/compatibility" xmlns:pvml="urn:schemas-microsoft-com:office:powerpoint" xmlns:v="urn:schemas-microsoft-com:vml" xmlns:o="urn:schemas-microsoft-com:office:office" xmlns:dgm="http://schemas.openxmlformats.org/drawingml/2006/diagram" xmlns:c="http://schemas.openxmlformats.org/drawingml/2006/chart" xmlns:mv="urn:schemas-microsoft-com:mac:vml" xmlns="">
+    <mc:Fallback xmlns="" xmlns:mv="urn:schemas-microsoft-com:mac:vml" xmlns:c="http://schemas.openxmlformats.org/drawingml/2006/chart" xmlns:dgm="http://schemas.openxmlformats.org/drawingml/2006/diagram" xmlns:o="urn:schemas-microsoft-com:office:office" xmlns:v="urn:schemas-microsoft-com:vml" xmlns:pvml="urn:schemas-microsoft-com:office:powerpoint" xmlns:com="http://schemas.openxmlformats.org/drawingml/2006/compatibility" xmlns:p15="http://schemas.microsoft.com/office/powerpoint/2012/main" xmlns:ahyp="http://schemas.microsoft.com/office/drawing/2018/hyperlinkcolor">
       <p:transition spd="slow">
         <p:fade/>
       </p:transition>
@@ -25173,7 +25173,7 @@
         <p:fade/>
       </p:transition>
     </mc:Choice>
-    <mc:Fallback xmlns:ahyp="http://schemas.microsoft.com/office/drawing/2018/hyperlinkcolor" xmlns:p15="http://schemas.microsoft.com/office/powerpoint/2012/main" xmlns:com="http://schemas.openxmlformats.org/drawingml/2006/compatibility" xmlns:pvml="urn:schemas-microsoft-com:office:powerpoint" xmlns:v="urn:schemas-microsoft-com:vml" xmlns:o="urn:schemas-microsoft-com:office:office" xmlns:dgm="http://schemas.openxmlformats.org/drawingml/2006/diagram" xmlns:c="http://schemas.openxmlformats.org/drawingml/2006/chart" xmlns:mv="urn:schemas-microsoft-com:mac:vml" xmlns="">
+    <mc:Fallback xmlns="" xmlns:mv="urn:schemas-microsoft-com:mac:vml" xmlns:c="http://schemas.openxmlformats.org/drawingml/2006/chart" xmlns:dgm="http://schemas.openxmlformats.org/drawingml/2006/diagram" xmlns:o="urn:schemas-microsoft-com:office:office" xmlns:v="urn:schemas-microsoft-com:vml" xmlns:pvml="urn:schemas-microsoft-com:office:powerpoint" xmlns:com="http://schemas.openxmlformats.org/drawingml/2006/compatibility" xmlns:p15="http://schemas.microsoft.com/office/powerpoint/2012/main" xmlns:ahyp="http://schemas.microsoft.com/office/drawing/2018/hyperlinkcolor">
       <p:transition spd="slow">
         <p:fade/>
       </p:transition>
@@ -25733,7 +25733,7 @@
         <p:fade/>
       </p:transition>
     </mc:Choice>
-    <mc:Fallback xmlns:ahyp="http://schemas.microsoft.com/office/drawing/2018/hyperlinkcolor" xmlns:p15="http://schemas.microsoft.com/office/powerpoint/2012/main" xmlns:com="http://schemas.openxmlformats.org/drawingml/2006/compatibility" xmlns:pvml="urn:schemas-microsoft-com:office:powerpoint" xmlns:v="urn:schemas-microsoft-com:vml" xmlns:o="urn:schemas-microsoft-com:office:office" xmlns:dgm="http://schemas.openxmlformats.org/drawingml/2006/diagram" xmlns:c="http://schemas.openxmlformats.org/drawingml/2006/chart" xmlns:mv="urn:schemas-microsoft-com:mac:vml" xmlns="">
+    <mc:Fallback xmlns="" xmlns:mv="urn:schemas-microsoft-com:mac:vml" xmlns:c="http://schemas.openxmlformats.org/drawingml/2006/chart" xmlns:dgm="http://schemas.openxmlformats.org/drawingml/2006/diagram" xmlns:o="urn:schemas-microsoft-com:office:office" xmlns:v="urn:schemas-microsoft-com:vml" xmlns:pvml="urn:schemas-microsoft-com:office:powerpoint" xmlns:com="http://schemas.openxmlformats.org/drawingml/2006/compatibility" xmlns:p15="http://schemas.microsoft.com/office/powerpoint/2012/main" xmlns:ahyp="http://schemas.microsoft.com/office/drawing/2018/hyperlinkcolor">
       <p:transition spd="slow">
         <p:fade/>
       </p:transition>
@@ -26535,7 +26535,7 @@
         <p:fade/>
       </p:transition>
     </mc:Choice>
-    <mc:Fallback xmlns:ahyp="http://schemas.microsoft.com/office/drawing/2018/hyperlinkcolor" xmlns:p15="http://schemas.microsoft.com/office/powerpoint/2012/main" xmlns:com="http://schemas.openxmlformats.org/drawingml/2006/compatibility" xmlns:pvml="urn:schemas-microsoft-com:office:powerpoint" xmlns:v="urn:schemas-microsoft-com:vml" xmlns:o="urn:schemas-microsoft-com:office:office" xmlns:dgm="http://schemas.openxmlformats.org/drawingml/2006/diagram" xmlns:c="http://schemas.openxmlformats.org/drawingml/2006/chart" xmlns:mv="urn:schemas-microsoft-com:mac:vml" xmlns="">
+    <mc:Fallback xmlns="" xmlns:mv="urn:schemas-microsoft-com:mac:vml" xmlns:c="http://schemas.openxmlformats.org/drawingml/2006/chart" xmlns:dgm="http://schemas.openxmlformats.org/drawingml/2006/diagram" xmlns:o="urn:schemas-microsoft-com:office:office" xmlns:v="urn:schemas-microsoft-com:vml" xmlns:pvml="urn:schemas-microsoft-com:office:powerpoint" xmlns:com="http://schemas.openxmlformats.org/drawingml/2006/compatibility" xmlns:p15="http://schemas.microsoft.com/office/powerpoint/2012/main" xmlns:ahyp="http://schemas.microsoft.com/office/drawing/2018/hyperlinkcolor">
       <p:transition spd="slow">
         <p:fade/>
       </p:transition>
@@ -26943,7 +26943,7 @@
         </p:nvSpPr>
         <p:spPr>
           <a:xfrm>
-            <a:off x="0" y="57301"/>
+            <a:off x="0" y="57300"/>
             <a:ext cx="9144000" cy="5086050"/>
           </a:xfrm>
           <a:prstGeom prst="rect">
@@ -26985,7 +26985,7 @@
               <a:buFont typeface="Arial"/>
               <a:buNone/>
             </a:pPr>
-            <a:endParaRPr sz="1400" b="0" i="0" strike="noStrike" cap="none">
+            <a:endParaRPr sz="1400" b="0" i="0" strike="noStrike" cap="none" dirty="0">
               <a:solidFill>
                 <a:srgbClr val="000000"/>
               </a:solidFill>
@@ -27156,8 +27156,8 @@
         </p:nvSpPr>
         <p:spPr>
           <a:xfrm>
-            <a:off x="467550" y="1203598"/>
-            <a:ext cx="8520600" cy="1519790"/>
+            <a:off x="467550" y="1203597"/>
+            <a:ext cx="8520600" cy="1977153"/>
           </a:xfrm>
           <a:prstGeom prst="rect">
             <a:avLst/>
@@ -27236,7 +27236,7 @@
               <a:buSzPts val="1100"/>
             </a:pPr>
             <a:r>
-              <a:rPr lang="en-US" sz="5400" b="1" dirty="0" err="1">
+              <a:rPr lang="pt-BR" sz="5400" b="1">
                 <a:solidFill>
                   <a:schemeClr val="lt1"/>
                 </a:solidFill>
@@ -27245,10 +27245,10 @@
                 <a:cs typeface="Century Gothic"/>
                 <a:sym typeface="Century Gothic"/>
               </a:rPr>
-              <a:t>Apresentação</a:t>
+              <a:t>Introdução </a:t>
             </a:r>
             <a:r>
-              <a:rPr lang="en-US" sz="5400" b="1" dirty="0">
+              <a:rPr lang="pt-BR" sz="5400" b="1" dirty="0">
                 <a:solidFill>
                   <a:schemeClr val="lt1"/>
                 </a:solidFill>
@@ -27257,19 +27257,7 @@
                 <a:cs typeface="Century Gothic"/>
                 <a:sym typeface="Century Gothic"/>
               </a:rPr>
-              <a:t> do </a:t>
-            </a:r>
-            <a:r>
-              <a:rPr lang="en-US" sz="5400" b="1" dirty="0" err="1">
-                <a:solidFill>
-                  <a:schemeClr val="lt1"/>
-                </a:solidFill>
-                <a:latin typeface="Century Gothic"/>
-                <a:ea typeface="Century Gothic"/>
-                <a:cs typeface="Century Gothic"/>
-                <a:sym typeface="Century Gothic"/>
-              </a:rPr>
-              <a:t>curso</a:t>
+              <a:t>ao Curso e Conceitos Básicos</a:t>
             </a:r>
             <a:endParaRPr sz="5400" b="1" i="0" u="none" strike="noStrike" cap="none" dirty="0">
               <a:solidFill>
@@ -27291,7 +27279,7 @@
         </p:nvSpPr>
         <p:spPr>
           <a:xfrm>
-            <a:off x="497019" y="2499742"/>
+            <a:off x="465750" y="3218164"/>
             <a:ext cx="7923965" cy="595132"/>
           </a:xfrm>
           <a:prstGeom prst="rect">
@@ -27340,7 +27328,7 @@
         <p:fade/>
       </p:transition>
     </mc:Choice>
-    <mc:Fallback xmlns:ahyp="http://schemas.microsoft.com/office/drawing/2018/hyperlinkcolor" xmlns:p15="http://schemas.microsoft.com/office/powerpoint/2012/main" xmlns:com="http://schemas.openxmlformats.org/drawingml/2006/compatibility" xmlns:pvml="urn:schemas-microsoft-com:office:powerpoint" xmlns:v="urn:schemas-microsoft-com:vml" xmlns:o="urn:schemas-microsoft-com:office:office" xmlns:dgm="http://schemas.openxmlformats.org/drawingml/2006/diagram" xmlns:c="http://schemas.openxmlformats.org/drawingml/2006/chart" xmlns:mv="urn:schemas-microsoft-com:mac:vml" xmlns="">
+    <mc:Fallback xmlns="" xmlns:mv="urn:schemas-microsoft-com:mac:vml" xmlns:c="http://schemas.openxmlformats.org/drawingml/2006/chart" xmlns:dgm="http://schemas.openxmlformats.org/drawingml/2006/diagram" xmlns:o="urn:schemas-microsoft-com:office:office" xmlns:v="urn:schemas-microsoft-com:vml" xmlns:pvml="urn:schemas-microsoft-com:office:powerpoint" xmlns:com="http://schemas.openxmlformats.org/drawingml/2006/compatibility" xmlns:p15="http://schemas.microsoft.com/office/powerpoint/2012/main" xmlns:ahyp="http://schemas.microsoft.com/office/drawing/2018/hyperlinkcolor">
       <p:transition spd="slow">
         <p:fade/>
       </p:transition>
@@ -27679,7 +27667,7 @@
         <p:fade/>
       </p:transition>
     </mc:Choice>
-    <mc:Fallback xmlns:ahyp="http://schemas.microsoft.com/office/drawing/2018/hyperlinkcolor" xmlns:p15="http://schemas.microsoft.com/office/powerpoint/2012/main" xmlns:com="http://schemas.openxmlformats.org/drawingml/2006/compatibility" xmlns:pvml="urn:schemas-microsoft-com:office:powerpoint" xmlns:v="urn:schemas-microsoft-com:vml" xmlns:o="urn:schemas-microsoft-com:office:office" xmlns:dgm="http://schemas.openxmlformats.org/drawingml/2006/diagram" xmlns:c="http://schemas.openxmlformats.org/drawingml/2006/chart" xmlns:mv="urn:schemas-microsoft-com:mac:vml" xmlns="">
+    <mc:Fallback xmlns="" xmlns:mv="urn:schemas-microsoft-com:mac:vml" xmlns:c="http://schemas.openxmlformats.org/drawingml/2006/chart" xmlns:dgm="http://schemas.openxmlformats.org/drawingml/2006/diagram" xmlns:o="urn:schemas-microsoft-com:office:office" xmlns:v="urn:schemas-microsoft-com:vml" xmlns:pvml="urn:schemas-microsoft-com:office:powerpoint" xmlns:com="http://schemas.openxmlformats.org/drawingml/2006/compatibility" xmlns:p15="http://schemas.microsoft.com/office/powerpoint/2012/main" xmlns:ahyp="http://schemas.microsoft.com/office/drawing/2018/hyperlinkcolor">
       <p:transition spd="slow">
         <p:fade/>
       </p:transition>
@@ -28005,7 +27993,7 @@
         <p:fade/>
       </p:transition>
     </mc:Choice>
-    <mc:Fallback xmlns:ahyp="http://schemas.microsoft.com/office/drawing/2018/hyperlinkcolor" xmlns:p15="http://schemas.microsoft.com/office/powerpoint/2012/main" xmlns:com="http://schemas.openxmlformats.org/drawingml/2006/compatibility" xmlns:pvml="urn:schemas-microsoft-com:office:powerpoint" xmlns:v="urn:schemas-microsoft-com:vml" xmlns:o="urn:schemas-microsoft-com:office:office" xmlns:dgm="http://schemas.openxmlformats.org/drawingml/2006/diagram" xmlns:c="http://schemas.openxmlformats.org/drawingml/2006/chart" xmlns:mv="urn:schemas-microsoft-com:mac:vml" xmlns="">
+    <mc:Fallback xmlns="" xmlns:mv="urn:schemas-microsoft-com:mac:vml" xmlns:c="http://schemas.openxmlformats.org/drawingml/2006/chart" xmlns:dgm="http://schemas.openxmlformats.org/drawingml/2006/diagram" xmlns:o="urn:schemas-microsoft-com:office:office" xmlns:v="urn:schemas-microsoft-com:vml" xmlns:pvml="urn:schemas-microsoft-com:office:powerpoint" xmlns:com="http://schemas.openxmlformats.org/drawingml/2006/compatibility" xmlns:p15="http://schemas.microsoft.com/office/powerpoint/2012/main" xmlns:ahyp="http://schemas.microsoft.com/office/drawing/2018/hyperlinkcolor">
       <p:transition spd="slow">
         <p:fade/>
       </p:transition>
@@ -28340,7 +28328,7 @@
         <p:fade/>
       </p:transition>
     </mc:Choice>
-    <mc:Fallback xmlns:ahyp="http://schemas.microsoft.com/office/drawing/2018/hyperlinkcolor" xmlns:p15="http://schemas.microsoft.com/office/powerpoint/2012/main" xmlns:com="http://schemas.openxmlformats.org/drawingml/2006/compatibility" xmlns:pvml="urn:schemas-microsoft-com:office:powerpoint" xmlns:v="urn:schemas-microsoft-com:vml" xmlns:o="urn:schemas-microsoft-com:office:office" xmlns:dgm="http://schemas.openxmlformats.org/drawingml/2006/diagram" xmlns:c="http://schemas.openxmlformats.org/drawingml/2006/chart" xmlns:mv="urn:schemas-microsoft-com:mac:vml" xmlns="">
+    <mc:Fallback xmlns="" xmlns:mv="urn:schemas-microsoft-com:mac:vml" xmlns:c="http://schemas.openxmlformats.org/drawingml/2006/chart" xmlns:dgm="http://schemas.openxmlformats.org/drawingml/2006/diagram" xmlns:o="urn:schemas-microsoft-com:office:office" xmlns:v="urn:schemas-microsoft-com:vml" xmlns:pvml="urn:schemas-microsoft-com:office:powerpoint" xmlns:com="http://schemas.openxmlformats.org/drawingml/2006/compatibility" xmlns:p15="http://schemas.microsoft.com/office/powerpoint/2012/main" xmlns:ahyp="http://schemas.microsoft.com/office/drawing/2018/hyperlinkcolor">
       <p:transition spd="slow">
         <p:fade/>
       </p:transition>
@@ -28626,7 +28614,7 @@
         <p:fade/>
       </p:transition>
     </mc:Choice>
-    <mc:Fallback xmlns:ahyp="http://schemas.microsoft.com/office/drawing/2018/hyperlinkcolor" xmlns:p15="http://schemas.microsoft.com/office/powerpoint/2012/main" xmlns:com="http://schemas.openxmlformats.org/drawingml/2006/compatibility" xmlns:pvml="urn:schemas-microsoft-com:office:powerpoint" xmlns:v="urn:schemas-microsoft-com:vml" xmlns:o="urn:schemas-microsoft-com:office:office" xmlns:dgm="http://schemas.openxmlformats.org/drawingml/2006/diagram" xmlns:c="http://schemas.openxmlformats.org/drawingml/2006/chart" xmlns:mv="urn:schemas-microsoft-com:mac:vml" xmlns="">
+    <mc:Fallback xmlns="" xmlns:mv="urn:schemas-microsoft-com:mac:vml" xmlns:c="http://schemas.openxmlformats.org/drawingml/2006/chart" xmlns:dgm="http://schemas.openxmlformats.org/drawingml/2006/diagram" xmlns:o="urn:schemas-microsoft-com:office:office" xmlns:v="urn:schemas-microsoft-com:vml" xmlns:pvml="urn:schemas-microsoft-com:office:powerpoint" xmlns:com="http://schemas.openxmlformats.org/drawingml/2006/compatibility" xmlns:p15="http://schemas.microsoft.com/office/powerpoint/2012/main" xmlns:ahyp="http://schemas.microsoft.com/office/drawing/2018/hyperlinkcolor">
       <p:transition spd="slow">
         <p:fade/>
       </p:transition>
@@ -29079,7 +29067,7 @@
         <p:fade/>
       </p:transition>
     </mc:Choice>
-    <mc:Fallback xmlns:ahyp="http://schemas.microsoft.com/office/drawing/2018/hyperlinkcolor" xmlns:p15="http://schemas.microsoft.com/office/powerpoint/2012/main" xmlns:com="http://schemas.openxmlformats.org/drawingml/2006/compatibility" xmlns:pvml="urn:schemas-microsoft-com:office:powerpoint" xmlns:v="urn:schemas-microsoft-com:vml" xmlns:o="urn:schemas-microsoft-com:office:office" xmlns:dgm="http://schemas.openxmlformats.org/drawingml/2006/diagram" xmlns:c="http://schemas.openxmlformats.org/drawingml/2006/chart" xmlns:mv="urn:schemas-microsoft-com:mac:vml" xmlns="">
+    <mc:Fallback xmlns="" xmlns:mv="urn:schemas-microsoft-com:mac:vml" xmlns:c="http://schemas.openxmlformats.org/drawingml/2006/chart" xmlns:dgm="http://schemas.openxmlformats.org/drawingml/2006/diagram" xmlns:o="urn:schemas-microsoft-com:office:office" xmlns:v="urn:schemas-microsoft-com:vml" xmlns:pvml="urn:schemas-microsoft-com:office:powerpoint" xmlns:com="http://schemas.openxmlformats.org/drawingml/2006/compatibility" xmlns:p15="http://schemas.microsoft.com/office/powerpoint/2012/main" xmlns:ahyp="http://schemas.microsoft.com/office/drawing/2018/hyperlinkcolor">
       <p:transition spd="slow">
         <p:fade/>
       </p:transition>
@@ -29365,7 +29353,7 @@
         <p:fade/>
       </p:transition>
     </mc:Choice>
-    <mc:Fallback xmlns:ahyp="http://schemas.microsoft.com/office/drawing/2018/hyperlinkcolor" xmlns:p15="http://schemas.microsoft.com/office/powerpoint/2012/main" xmlns:com="http://schemas.openxmlformats.org/drawingml/2006/compatibility" xmlns:pvml="urn:schemas-microsoft-com:office:powerpoint" xmlns:v="urn:schemas-microsoft-com:vml" xmlns:o="urn:schemas-microsoft-com:office:office" xmlns:dgm="http://schemas.openxmlformats.org/drawingml/2006/diagram" xmlns:c="http://schemas.openxmlformats.org/drawingml/2006/chart" xmlns:mv="urn:schemas-microsoft-com:mac:vml" xmlns="">
+    <mc:Fallback xmlns="" xmlns:mv="urn:schemas-microsoft-com:mac:vml" xmlns:c="http://schemas.openxmlformats.org/drawingml/2006/chart" xmlns:dgm="http://schemas.openxmlformats.org/drawingml/2006/diagram" xmlns:o="urn:schemas-microsoft-com:office:office" xmlns:v="urn:schemas-microsoft-com:vml" xmlns:pvml="urn:schemas-microsoft-com:office:powerpoint" xmlns:com="http://schemas.openxmlformats.org/drawingml/2006/compatibility" xmlns:p15="http://schemas.microsoft.com/office/powerpoint/2012/main" xmlns:ahyp="http://schemas.microsoft.com/office/drawing/2018/hyperlinkcolor">
       <p:transition spd="slow">
         <p:fade/>
       </p:transition>
@@ -29697,7 +29685,7 @@
         <p:fade/>
       </p:transition>
     </mc:Choice>
-    <mc:Fallback xmlns:ahyp="http://schemas.microsoft.com/office/drawing/2018/hyperlinkcolor" xmlns:p15="http://schemas.microsoft.com/office/powerpoint/2012/main" xmlns:com="http://schemas.openxmlformats.org/drawingml/2006/compatibility" xmlns:pvml="urn:schemas-microsoft-com:office:powerpoint" xmlns:v="urn:schemas-microsoft-com:vml" xmlns:o="urn:schemas-microsoft-com:office:office" xmlns:dgm="http://schemas.openxmlformats.org/drawingml/2006/diagram" xmlns:c="http://schemas.openxmlformats.org/drawingml/2006/chart" xmlns:mv="urn:schemas-microsoft-com:mac:vml" xmlns="">
+    <mc:Fallback xmlns="" xmlns:mv="urn:schemas-microsoft-com:mac:vml" xmlns:c="http://schemas.openxmlformats.org/drawingml/2006/chart" xmlns:dgm="http://schemas.openxmlformats.org/drawingml/2006/diagram" xmlns:o="urn:schemas-microsoft-com:office:office" xmlns:v="urn:schemas-microsoft-com:vml" xmlns:pvml="urn:schemas-microsoft-com:office:powerpoint" xmlns:com="http://schemas.openxmlformats.org/drawingml/2006/compatibility" xmlns:p15="http://schemas.microsoft.com/office/powerpoint/2012/main" xmlns:ahyp="http://schemas.microsoft.com/office/drawing/2018/hyperlinkcolor">
       <p:transition spd="slow">
         <p:fade/>
       </p:transition>

</xml_diff>

<commit_message>
Inclusão das Aulas de Generics juntamente com o código fonte da classe No refatorada.
</commit_message>
<xml_diff>
--- a/apresentacoes/Aula1/Etapa1-Apresentacao/Etapa1.pptx
+++ b/apresentacoes/Aula1/Etapa1-Apresentacao/Etapa1.pptx
@@ -299,7 +299,7 @@
       </p15:sldGuideLst>
     </p:ext>
     <p:ext uri="http://customooxmlschemas.google.com/">
-      <go:slidesCustomData xmlns="" xmlns:mc="http://schemas.openxmlformats.org/markup-compatibility/2006" xmlns:mv="urn:schemas-microsoft-com:mac:vml" xmlns:c="http://schemas.openxmlformats.org/drawingml/2006/chart" xmlns:dgm="http://schemas.openxmlformats.org/drawingml/2006/diagram" xmlns:o="urn:schemas-microsoft-com:office:office" xmlns:v="urn:schemas-microsoft-com:vml" xmlns:pvml="urn:schemas-microsoft-com:office:powerpoint" xmlns:com="http://schemas.openxmlformats.org/drawingml/2006/compatibility" xmlns:p14="http://schemas.microsoft.com/office/powerpoint/2010/main" xmlns:p15="http://schemas.microsoft.com/office/powerpoint/2012/main" xmlns:ahyp="http://schemas.microsoft.com/office/drawing/2018/hyperlinkcolor" xmlns:go="http://customooxmlschemas.google.com/" r:id="rId35" roundtripDataSignature="AMtx7mij1fsZUe5V3lBG5qQcqOvrI5UhJw=="/>
+      <go:slidesCustomData xmlns:go="http://customooxmlschemas.google.com/" xmlns:ahyp="http://schemas.microsoft.com/office/drawing/2018/hyperlinkcolor" xmlns:p15="http://schemas.microsoft.com/office/powerpoint/2012/main" xmlns:p14="http://schemas.microsoft.com/office/powerpoint/2010/main" xmlns:com="http://schemas.openxmlformats.org/drawingml/2006/compatibility" xmlns:pvml="urn:schemas-microsoft-com:office:powerpoint" xmlns:v="urn:schemas-microsoft-com:vml" xmlns:o="urn:schemas-microsoft-com:office:office" xmlns:dgm="http://schemas.openxmlformats.org/drawingml/2006/diagram" xmlns:c="http://schemas.openxmlformats.org/drawingml/2006/chart" xmlns:mv="urn:schemas-microsoft-com:mac:vml" xmlns:mc="http://schemas.openxmlformats.org/markup-compatibility/2006" xmlns="" r:id="rId35" roundtripDataSignature="AMtx7mij1fsZUe5V3lBG5qQcqOvrI5UhJw=="/>
     </p:ext>
   </p:extLst>
 </p:presentation>
@@ -22434,7 +22434,7 @@
         <p:fade/>
       </p:transition>
     </mc:Choice>
-    <mc:Fallback xmlns="" xmlns:mv="urn:schemas-microsoft-com:mac:vml" xmlns:c="http://schemas.openxmlformats.org/drawingml/2006/chart" xmlns:dgm="http://schemas.openxmlformats.org/drawingml/2006/diagram" xmlns:o="urn:schemas-microsoft-com:office:office" xmlns:v="urn:schemas-microsoft-com:vml" xmlns:pvml="urn:schemas-microsoft-com:office:powerpoint" xmlns:com="http://schemas.openxmlformats.org/drawingml/2006/compatibility" xmlns:p15="http://schemas.microsoft.com/office/powerpoint/2012/main" xmlns:ahyp="http://schemas.microsoft.com/office/drawing/2018/hyperlinkcolor">
+    <mc:Fallback xmlns:ahyp="http://schemas.microsoft.com/office/drawing/2018/hyperlinkcolor" xmlns:p15="http://schemas.microsoft.com/office/powerpoint/2012/main" xmlns:com="http://schemas.openxmlformats.org/drawingml/2006/compatibility" xmlns:pvml="urn:schemas-microsoft-com:office:powerpoint" xmlns:v="urn:schemas-microsoft-com:vml" xmlns:o="urn:schemas-microsoft-com:office:office" xmlns:dgm="http://schemas.openxmlformats.org/drawingml/2006/diagram" xmlns:c="http://schemas.openxmlformats.org/drawingml/2006/chart" xmlns:mv="urn:schemas-microsoft-com:mac:vml" xmlns="">
       <p:transition spd="slow">
         <p:fade/>
       </p:transition>
@@ -22754,7 +22754,7 @@
         <p:fade/>
       </p:transition>
     </mc:Choice>
-    <mc:Fallback xmlns="" xmlns:mv="urn:schemas-microsoft-com:mac:vml" xmlns:c="http://schemas.openxmlformats.org/drawingml/2006/chart" xmlns:dgm="http://schemas.openxmlformats.org/drawingml/2006/diagram" xmlns:o="urn:schemas-microsoft-com:office:office" xmlns:v="urn:schemas-microsoft-com:vml" xmlns:pvml="urn:schemas-microsoft-com:office:powerpoint" xmlns:com="http://schemas.openxmlformats.org/drawingml/2006/compatibility" xmlns:p15="http://schemas.microsoft.com/office/powerpoint/2012/main" xmlns:ahyp="http://schemas.microsoft.com/office/drawing/2018/hyperlinkcolor">
+    <mc:Fallback xmlns:ahyp="http://schemas.microsoft.com/office/drawing/2018/hyperlinkcolor" xmlns:p15="http://schemas.microsoft.com/office/powerpoint/2012/main" xmlns:com="http://schemas.openxmlformats.org/drawingml/2006/compatibility" xmlns:pvml="urn:schemas-microsoft-com:office:powerpoint" xmlns:v="urn:schemas-microsoft-com:vml" xmlns:o="urn:schemas-microsoft-com:office:office" xmlns:dgm="http://schemas.openxmlformats.org/drawingml/2006/diagram" xmlns:c="http://schemas.openxmlformats.org/drawingml/2006/chart" xmlns:mv="urn:schemas-microsoft-com:mac:vml" xmlns="">
       <p:transition spd="slow">
         <p:fade/>
       </p:transition>
@@ -23162,7 +23162,7 @@
         <p:fade/>
       </p:transition>
     </mc:Choice>
-    <mc:Fallback xmlns="" xmlns:mv="urn:schemas-microsoft-com:mac:vml" xmlns:c="http://schemas.openxmlformats.org/drawingml/2006/chart" xmlns:dgm="http://schemas.openxmlformats.org/drawingml/2006/diagram" xmlns:o="urn:schemas-microsoft-com:office:office" xmlns:v="urn:schemas-microsoft-com:vml" xmlns:pvml="urn:schemas-microsoft-com:office:powerpoint" xmlns:com="http://schemas.openxmlformats.org/drawingml/2006/compatibility" xmlns:p15="http://schemas.microsoft.com/office/powerpoint/2012/main" xmlns:ahyp="http://schemas.microsoft.com/office/drawing/2018/hyperlinkcolor">
+    <mc:Fallback xmlns:ahyp="http://schemas.microsoft.com/office/drawing/2018/hyperlinkcolor" xmlns:p15="http://schemas.microsoft.com/office/powerpoint/2012/main" xmlns:com="http://schemas.openxmlformats.org/drawingml/2006/compatibility" xmlns:pvml="urn:schemas-microsoft-com:office:powerpoint" xmlns:v="urn:schemas-microsoft-com:vml" xmlns:o="urn:schemas-microsoft-com:office:office" xmlns:dgm="http://schemas.openxmlformats.org/drawingml/2006/diagram" xmlns:c="http://schemas.openxmlformats.org/drawingml/2006/chart" xmlns:mv="urn:schemas-microsoft-com:mac:vml" xmlns="">
       <p:transition spd="slow">
         <p:fade/>
       </p:transition>
@@ -23590,7 +23590,7 @@
         <p:fade/>
       </p:transition>
     </mc:Choice>
-    <mc:Fallback xmlns="" xmlns:mv="urn:schemas-microsoft-com:mac:vml" xmlns:c="http://schemas.openxmlformats.org/drawingml/2006/chart" xmlns:dgm="http://schemas.openxmlformats.org/drawingml/2006/diagram" xmlns:o="urn:schemas-microsoft-com:office:office" xmlns:v="urn:schemas-microsoft-com:vml" xmlns:pvml="urn:schemas-microsoft-com:office:powerpoint" xmlns:com="http://schemas.openxmlformats.org/drawingml/2006/compatibility" xmlns:p15="http://schemas.microsoft.com/office/powerpoint/2012/main" xmlns:ahyp="http://schemas.microsoft.com/office/drawing/2018/hyperlinkcolor">
+    <mc:Fallback xmlns:ahyp="http://schemas.microsoft.com/office/drawing/2018/hyperlinkcolor" xmlns:p15="http://schemas.microsoft.com/office/powerpoint/2012/main" xmlns:com="http://schemas.openxmlformats.org/drawingml/2006/compatibility" xmlns:pvml="urn:schemas-microsoft-com:office:powerpoint" xmlns:v="urn:schemas-microsoft-com:vml" xmlns:o="urn:schemas-microsoft-com:office:office" xmlns:dgm="http://schemas.openxmlformats.org/drawingml/2006/diagram" xmlns:c="http://schemas.openxmlformats.org/drawingml/2006/chart" xmlns:mv="urn:schemas-microsoft-com:mac:vml" xmlns="">
       <p:transition spd="slow">
         <p:fade/>
       </p:transition>
@@ -23965,7 +23965,7 @@
         <p:fade/>
       </p:transition>
     </mc:Choice>
-    <mc:Fallback xmlns="" xmlns:mv="urn:schemas-microsoft-com:mac:vml" xmlns:c="http://schemas.openxmlformats.org/drawingml/2006/chart" xmlns:dgm="http://schemas.openxmlformats.org/drawingml/2006/diagram" xmlns:o="urn:schemas-microsoft-com:office:office" xmlns:v="urn:schemas-microsoft-com:vml" xmlns:pvml="urn:schemas-microsoft-com:office:powerpoint" xmlns:com="http://schemas.openxmlformats.org/drawingml/2006/compatibility" xmlns:p15="http://schemas.microsoft.com/office/powerpoint/2012/main" xmlns:ahyp="http://schemas.microsoft.com/office/drawing/2018/hyperlinkcolor">
+    <mc:Fallback xmlns:ahyp="http://schemas.microsoft.com/office/drawing/2018/hyperlinkcolor" xmlns:p15="http://schemas.microsoft.com/office/powerpoint/2012/main" xmlns:com="http://schemas.openxmlformats.org/drawingml/2006/compatibility" xmlns:pvml="urn:schemas-microsoft-com:office:powerpoint" xmlns:v="urn:schemas-microsoft-com:vml" xmlns:o="urn:schemas-microsoft-com:office:office" xmlns:dgm="http://schemas.openxmlformats.org/drawingml/2006/diagram" xmlns:c="http://schemas.openxmlformats.org/drawingml/2006/chart" xmlns:mv="urn:schemas-microsoft-com:mac:vml" xmlns="">
       <p:transition spd="slow">
         <p:fade/>
       </p:transition>
@@ -24340,7 +24340,7 @@
         <p:fade/>
       </p:transition>
     </mc:Choice>
-    <mc:Fallback xmlns="" xmlns:mv="urn:schemas-microsoft-com:mac:vml" xmlns:c="http://schemas.openxmlformats.org/drawingml/2006/chart" xmlns:dgm="http://schemas.openxmlformats.org/drawingml/2006/diagram" xmlns:o="urn:schemas-microsoft-com:office:office" xmlns:v="urn:schemas-microsoft-com:vml" xmlns:pvml="urn:schemas-microsoft-com:office:powerpoint" xmlns:com="http://schemas.openxmlformats.org/drawingml/2006/compatibility" xmlns:p15="http://schemas.microsoft.com/office/powerpoint/2012/main" xmlns:ahyp="http://schemas.microsoft.com/office/drawing/2018/hyperlinkcolor">
+    <mc:Fallback xmlns:ahyp="http://schemas.microsoft.com/office/drawing/2018/hyperlinkcolor" xmlns:p15="http://schemas.microsoft.com/office/powerpoint/2012/main" xmlns:com="http://schemas.openxmlformats.org/drawingml/2006/compatibility" xmlns:pvml="urn:schemas-microsoft-com:office:powerpoint" xmlns:v="urn:schemas-microsoft-com:vml" xmlns:o="urn:schemas-microsoft-com:office:office" xmlns:dgm="http://schemas.openxmlformats.org/drawingml/2006/diagram" xmlns:c="http://schemas.openxmlformats.org/drawingml/2006/chart" xmlns:mv="urn:schemas-microsoft-com:mac:vml" xmlns="">
       <p:transition spd="slow">
         <p:fade/>
       </p:transition>
@@ -24715,7 +24715,7 @@
         <p:fade/>
       </p:transition>
     </mc:Choice>
-    <mc:Fallback xmlns="" xmlns:mv="urn:schemas-microsoft-com:mac:vml" xmlns:c="http://schemas.openxmlformats.org/drawingml/2006/chart" xmlns:dgm="http://schemas.openxmlformats.org/drawingml/2006/diagram" xmlns:o="urn:schemas-microsoft-com:office:office" xmlns:v="urn:schemas-microsoft-com:vml" xmlns:pvml="urn:schemas-microsoft-com:office:powerpoint" xmlns:com="http://schemas.openxmlformats.org/drawingml/2006/compatibility" xmlns:p15="http://schemas.microsoft.com/office/powerpoint/2012/main" xmlns:ahyp="http://schemas.microsoft.com/office/drawing/2018/hyperlinkcolor">
+    <mc:Fallback xmlns:ahyp="http://schemas.microsoft.com/office/drawing/2018/hyperlinkcolor" xmlns:p15="http://schemas.microsoft.com/office/powerpoint/2012/main" xmlns:com="http://schemas.openxmlformats.org/drawingml/2006/compatibility" xmlns:pvml="urn:schemas-microsoft-com:office:powerpoint" xmlns:v="urn:schemas-microsoft-com:vml" xmlns:o="urn:schemas-microsoft-com:office:office" xmlns:dgm="http://schemas.openxmlformats.org/drawingml/2006/diagram" xmlns:c="http://schemas.openxmlformats.org/drawingml/2006/chart" xmlns:mv="urn:schemas-microsoft-com:mac:vml" xmlns="">
       <p:transition spd="slow">
         <p:fade/>
       </p:transition>
@@ -25173,7 +25173,7 @@
         <p:fade/>
       </p:transition>
     </mc:Choice>
-    <mc:Fallback xmlns="" xmlns:mv="urn:schemas-microsoft-com:mac:vml" xmlns:c="http://schemas.openxmlformats.org/drawingml/2006/chart" xmlns:dgm="http://schemas.openxmlformats.org/drawingml/2006/diagram" xmlns:o="urn:schemas-microsoft-com:office:office" xmlns:v="urn:schemas-microsoft-com:vml" xmlns:pvml="urn:schemas-microsoft-com:office:powerpoint" xmlns:com="http://schemas.openxmlformats.org/drawingml/2006/compatibility" xmlns:p15="http://schemas.microsoft.com/office/powerpoint/2012/main" xmlns:ahyp="http://schemas.microsoft.com/office/drawing/2018/hyperlinkcolor">
+    <mc:Fallback xmlns:ahyp="http://schemas.microsoft.com/office/drawing/2018/hyperlinkcolor" xmlns:p15="http://schemas.microsoft.com/office/powerpoint/2012/main" xmlns:com="http://schemas.openxmlformats.org/drawingml/2006/compatibility" xmlns:pvml="urn:schemas-microsoft-com:office:powerpoint" xmlns:v="urn:schemas-microsoft-com:vml" xmlns:o="urn:schemas-microsoft-com:office:office" xmlns:dgm="http://schemas.openxmlformats.org/drawingml/2006/diagram" xmlns:c="http://schemas.openxmlformats.org/drawingml/2006/chart" xmlns:mv="urn:schemas-microsoft-com:mac:vml" xmlns="">
       <p:transition spd="slow">
         <p:fade/>
       </p:transition>
@@ -25733,7 +25733,7 @@
         <p:fade/>
       </p:transition>
     </mc:Choice>
-    <mc:Fallback xmlns="" xmlns:mv="urn:schemas-microsoft-com:mac:vml" xmlns:c="http://schemas.openxmlformats.org/drawingml/2006/chart" xmlns:dgm="http://schemas.openxmlformats.org/drawingml/2006/diagram" xmlns:o="urn:schemas-microsoft-com:office:office" xmlns:v="urn:schemas-microsoft-com:vml" xmlns:pvml="urn:schemas-microsoft-com:office:powerpoint" xmlns:com="http://schemas.openxmlformats.org/drawingml/2006/compatibility" xmlns:p15="http://schemas.microsoft.com/office/powerpoint/2012/main" xmlns:ahyp="http://schemas.microsoft.com/office/drawing/2018/hyperlinkcolor">
+    <mc:Fallback xmlns:ahyp="http://schemas.microsoft.com/office/drawing/2018/hyperlinkcolor" xmlns:p15="http://schemas.microsoft.com/office/powerpoint/2012/main" xmlns:com="http://schemas.openxmlformats.org/drawingml/2006/compatibility" xmlns:pvml="urn:schemas-microsoft-com:office:powerpoint" xmlns:v="urn:schemas-microsoft-com:vml" xmlns:o="urn:schemas-microsoft-com:office:office" xmlns:dgm="http://schemas.openxmlformats.org/drawingml/2006/diagram" xmlns:c="http://schemas.openxmlformats.org/drawingml/2006/chart" xmlns:mv="urn:schemas-microsoft-com:mac:vml" xmlns="">
       <p:transition spd="slow">
         <p:fade/>
       </p:transition>
@@ -26496,10 +26496,10 @@
       </p:sp>
       <p:pic>
         <p:nvPicPr>
-          <p:cNvPr id="13" name="Imagem 12">
+          <p:cNvPr id="14" name="Imagem 13">
             <a:extLst>
               <a:ext uri="{FF2B5EF4-FFF2-40B4-BE49-F238E27FC236}">
-                <a16:creationId xmlns:a16="http://schemas.microsoft.com/office/drawing/2014/main" id="{9E2F144C-6642-490E-BAC0-AE3FD351C19C}"/>
+                <a16:creationId xmlns:a16="http://schemas.microsoft.com/office/drawing/2014/main" id="{32E2A692-6ECB-4EC3-9535-5899143191B8}"/>
               </a:ext>
             </a:extLst>
           </p:cNvPr>
@@ -26516,8 +26516,8 @@
         </p:blipFill>
         <p:spPr>
           <a:xfrm>
-            <a:off x="7327953" y="2995971"/>
-            <a:ext cx="1656747" cy="1656747"/>
+            <a:off x="7196362" y="2461450"/>
+            <a:ext cx="1938293" cy="2349447"/>
           </a:xfrm>
           <a:prstGeom prst="rect">
             <a:avLst/>
@@ -26535,7 +26535,7 @@
         <p:fade/>
       </p:transition>
     </mc:Choice>
-    <mc:Fallback xmlns="" xmlns:mv="urn:schemas-microsoft-com:mac:vml" xmlns:c="http://schemas.openxmlformats.org/drawingml/2006/chart" xmlns:dgm="http://schemas.openxmlformats.org/drawingml/2006/diagram" xmlns:o="urn:schemas-microsoft-com:office:office" xmlns:v="urn:schemas-microsoft-com:vml" xmlns:pvml="urn:schemas-microsoft-com:office:powerpoint" xmlns:com="http://schemas.openxmlformats.org/drawingml/2006/compatibility" xmlns:p15="http://schemas.microsoft.com/office/powerpoint/2012/main" xmlns:ahyp="http://schemas.microsoft.com/office/drawing/2018/hyperlinkcolor">
+    <mc:Fallback xmlns:ahyp="http://schemas.microsoft.com/office/drawing/2018/hyperlinkcolor" xmlns:p15="http://schemas.microsoft.com/office/powerpoint/2012/main" xmlns:com="http://schemas.openxmlformats.org/drawingml/2006/compatibility" xmlns:pvml="urn:schemas-microsoft-com:office:powerpoint" xmlns:v="urn:schemas-microsoft-com:vml" xmlns:o="urn:schemas-microsoft-com:office:office" xmlns:dgm="http://schemas.openxmlformats.org/drawingml/2006/diagram" xmlns:c="http://schemas.openxmlformats.org/drawingml/2006/chart" xmlns:mv="urn:schemas-microsoft-com:mac:vml" xmlns="">
       <p:transition spd="slow">
         <p:fade/>
       </p:transition>
@@ -27328,7 +27328,7 @@
         <p:fade/>
       </p:transition>
     </mc:Choice>
-    <mc:Fallback xmlns="" xmlns:mv="urn:schemas-microsoft-com:mac:vml" xmlns:c="http://schemas.openxmlformats.org/drawingml/2006/chart" xmlns:dgm="http://schemas.openxmlformats.org/drawingml/2006/diagram" xmlns:o="urn:schemas-microsoft-com:office:office" xmlns:v="urn:schemas-microsoft-com:vml" xmlns:pvml="urn:schemas-microsoft-com:office:powerpoint" xmlns:com="http://schemas.openxmlformats.org/drawingml/2006/compatibility" xmlns:p15="http://schemas.microsoft.com/office/powerpoint/2012/main" xmlns:ahyp="http://schemas.microsoft.com/office/drawing/2018/hyperlinkcolor">
+    <mc:Fallback xmlns:ahyp="http://schemas.microsoft.com/office/drawing/2018/hyperlinkcolor" xmlns:p15="http://schemas.microsoft.com/office/powerpoint/2012/main" xmlns:com="http://schemas.openxmlformats.org/drawingml/2006/compatibility" xmlns:pvml="urn:schemas-microsoft-com:office:powerpoint" xmlns:v="urn:schemas-microsoft-com:vml" xmlns:o="urn:schemas-microsoft-com:office:office" xmlns:dgm="http://schemas.openxmlformats.org/drawingml/2006/diagram" xmlns:c="http://schemas.openxmlformats.org/drawingml/2006/chart" xmlns:mv="urn:schemas-microsoft-com:mac:vml" xmlns="">
       <p:transition spd="slow">
         <p:fade/>
       </p:transition>
@@ -27667,7 +27667,7 @@
         <p:fade/>
       </p:transition>
     </mc:Choice>
-    <mc:Fallback xmlns="" xmlns:mv="urn:schemas-microsoft-com:mac:vml" xmlns:c="http://schemas.openxmlformats.org/drawingml/2006/chart" xmlns:dgm="http://schemas.openxmlformats.org/drawingml/2006/diagram" xmlns:o="urn:schemas-microsoft-com:office:office" xmlns:v="urn:schemas-microsoft-com:vml" xmlns:pvml="urn:schemas-microsoft-com:office:powerpoint" xmlns:com="http://schemas.openxmlformats.org/drawingml/2006/compatibility" xmlns:p15="http://schemas.microsoft.com/office/powerpoint/2012/main" xmlns:ahyp="http://schemas.microsoft.com/office/drawing/2018/hyperlinkcolor">
+    <mc:Fallback xmlns:ahyp="http://schemas.microsoft.com/office/drawing/2018/hyperlinkcolor" xmlns:p15="http://schemas.microsoft.com/office/powerpoint/2012/main" xmlns:com="http://schemas.openxmlformats.org/drawingml/2006/compatibility" xmlns:pvml="urn:schemas-microsoft-com:office:powerpoint" xmlns:v="urn:schemas-microsoft-com:vml" xmlns:o="urn:schemas-microsoft-com:office:office" xmlns:dgm="http://schemas.openxmlformats.org/drawingml/2006/diagram" xmlns:c="http://schemas.openxmlformats.org/drawingml/2006/chart" xmlns:mv="urn:schemas-microsoft-com:mac:vml" xmlns="">
       <p:transition spd="slow">
         <p:fade/>
       </p:transition>
@@ -27993,7 +27993,7 @@
         <p:fade/>
       </p:transition>
     </mc:Choice>
-    <mc:Fallback xmlns="" xmlns:mv="urn:schemas-microsoft-com:mac:vml" xmlns:c="http://schemas.openxmlformats.org/drawingml/2006/chart" xmlns:dgm="http://schemas.openxmlformats.org/drawingml/2006/diagram" xmlns:o="urn:schemas-microsoft-com:office:office" xmlns:v="urn:schemas-microsoft-com:vml" xmlns:pvml="urn:schemas-microsoft-com:office:powerpoint" xmlns:com="http://schemas.openxmlformats.org/drawingml/2006/compatibility" xmlns:p15="http://schemas.microsoft.com/office/powerpoint/2012/main" xmlns:ahyp="http://schemas.microsoft.com/office/drawing/2018/hyperlinkcolor">
+    <mc:Fallback xmlns:ahyp="http://schemas.microsoft.com/office/drawing/2018/hyperlinkcolor" xmlns:p15="http://schemas.microsoft.com/office/powerpoint/2012/main" xmlns:com="http://schemas.openxmlformats.org/drawingml/2006/compatibility" xmlns:pvml="urn:schemas-microsoft-com:office:powerpoint" xmlns:v="urn:schemas-microsoft-com:vml" xmlns:o="urn:schemas-microsoft-com:office:office" xmlns:dgm="http://schemas.openxmlformats.org/drawingml/2006/diagram" xmlns:c="http://schemas.openxmlformats.org/drawingml/2006/chart" xmlns:mv="urn:schemas-microsoft-com:mac:vml" xmlns="">
       <p:transition spd="slow">
         <p:fade/>
       </p:transition>
@@ -28328,7 +28328,7 @@
         <p:fade/>
       </p:transition>
     </mc:Choice>
-    <mc:Fallback xmlns="" xmlns:mv="urn:schemas-microsoft-com:mac:vml" xmlns:c="http://schemas.openxmlformats.org/drawingml/2006/chart" xmlns:dgm="http://schemas.openxmlformats.org/drawingml/2006/diagram" xmlns:o="urn:schemas-microsoft-com:office:office" xmlns:v="urn:schemas-microsoft-com:vml" xmlns:pvml="urn:schemas-microsoft-com:office:powerpoint" xmlns:com="http://schemas.openxmlformats.org/drawingml/2006/compatibility" xmlns:p15="http://schemas.microsoft.com/office/powerpoint/2012/main" xmlns:ahyp="http://schemas.microsoft.com/office/drawing/2018/hyperlinkcolor">
+    <mc:Fallback xmlns:ahyp="http://schemas.microsoft.com/office/drawing/2018/hyperlinkcolor" xmlns:p15="http://schemas.microsoft.com/office/powerpoint/2012/main" xmlns:com="http://schemas.openxmlformats.org/drawingml/2006/compatibility" xmlns:pvml="urn:schemas-microsoft-com:office:powerpoint" xmlns:v="urn:schemas-microsoft-com:vml" xmlns:o="urn:schemas-microsoft-com:office:office" xmlns:dgm="http://schemas.openxmlformats.org/drawingml/2006/diagram" xmlns:c="http://schemas.openxmlformats.org/drawingml/2006/chart" xmlns:mv="urn:schemas-microsoft-com:mac:vml" xmlns="">
       <p:transition spd="slow">
         <p:fade/>
       </p:transition>
@@ -28614,7 +28614,7 @@
         <p:fade/>
       </p:transition>
     </mc:Choice>
-    <mc:Fallback xmlns="" xmlns:mv="urn:schemas-microsoft-com:mac:vml" xmlns:c="http://schemas.openxmlformats.org/drawingml/2006/chart" xmlns:dgm="http://schemas.openxmlformats.org/drawingml/2006/diagram" xmlns:o="urn:schemas-microsoft-com:office:office" xmlns:v="urn:schemas-microsoft-com:vml" xmlns:pvml="urn:schemas-microsoft-com:office:powerpoint" xmlns:com="http://schemas.openxmlformats.org/drawingml/2006/compatibility" xmlns:p15="http://schemas.microsoft.com/office/powerpoint/2012/main" xmlns:ahyp="http://schemas.microsoft.com/office/drawing/2018/hyperlinkcolor">
+    <mc:Fallback xmlns:ahyp="http://schemas.microsoft.com/office/drawing/2018/hyperlinkcolor" xmlns:p15="http://schemas.microsoft.com/office/powerpoint/2012/main" xmlns:com="http://schemas.openxmlformats.org/drawingml/2006/compatibility" xmlns:pvml="urn:schemas-microsoft-com:office:powerpoint" xmlns:v="urn:schemas-microsoft-com:vml" xmlns:o="urn:schemas-microsoft-com:office:office" xmlns:dgm="http://schemas.openxmlformats.org/drawingml/2006/diagram" xmlns:c="http://schemas.openxmlformats.org/drawingml/2006/chart" xmlns:mv="urn:schemas-microsoft-com:mac:vml" xmlns="">
       <p:transition spd="slow">
         <p:fade/>
       </p:transition>
@@ -29067,7 +29067,7 @@
         <p:fade/>
       </p:transition>
     </mc:Choice>
-    <mc:Fallback xmlns="" xmlns:mv="urn:schemas-microsoft-com:mac:vml" xmlns:c="http://schemas.openxmlformats.org/drawingml/2006/chart" xmlns:dgm="http://schemas.openxmlformats.org/drawingml/2006/diagram" xmlns:o="urn:schemas-microsoft-com:office:office" xmlns:v="urn:schemas-microsoft-com:vml" xmlns:pvml="urn:schemas-microsoft-com:office:powerpoint" xmlns:com="http://schemas.openxmlformats.org/drawingml/2006/compatibility" xmlns:p15="http://schemas.microsoft.com/office/powerpoint/2012/main" xmlns:ahyp="http://schemas.microsoft.com/office/drawing/2018/hyperlinkcolor">
+    <mc:Fallback xmlns:ahyp="http://schemas.microsoft.com/office/drawing/2018/hyperlinkcolor" xmlns:p15="http://schemas.microsoft.com/office/powerpoint/2012/main" xmlns:com="http://schemas.openxmlformats.org/drawingml/2006/compatibility" xmlns:pvml="urn:schemas-microsoft-com:office:powerpoint" xmlns:v="urn:schemas-microsoft-com:vml" xmlns:o="urn:schemas-microsoft-com:office:office" xmlns:dgm="http://schemas.openxmlformats.org/drawingml/2006/diagram" xmlns:c="http://schemas.openxmlformats.org/drawingml/2006/chart" xmlns:mv="urn:schemas-microsoft-com:mac:vml" xmlns="">
       <p:transition spd="slow">
         <p:fade/>
       </p:transition>
@@ -29353,7 +29353,7 @@
         <p:fade/>
       </p:transition>
     </mc:Choice>
-    <mc:Fallback xmlns="" xmlns:mv="urn:schemas-microsoft-com:mac:vml" xmlns:c="http://schemas.openxmlformats.org/drawingml/2006/chart" xmlns:dgm="http://schemas.openxmlformats.org/drawingml/2006/diagram" xmlns:o="urn:schemas-microsoft-com:office:office" xmlns:v="urn:schemas-microsoft-com:vml" xmlns:pvml="urn:schemas-microsoft-com:office:powerpoint" xmlns:com="http://schemas.openxmlformats.org/drawingml/2006/compatibility" xmlns:p15="http://schemas.microsoft.com/office/powerpoint/2012/main" xmlns:ahyp="http://schemas.microsoft.com/office/drawing/2018/hyperlinkcolor">
+    <mc:Fallback xmlns:ahyp="http://schemas.microsoft.com/office/drawing/2018/hyperlinkcolor" xmlns:p15="http://schemas.microsoft.com/office/powerpoint/2012/main" xmlns:com="http://schemas.openxmlformats.org/drawingml/2006/compatibility" xmlns:pvml="urn:schemas-microsoft-com:office:powerpoint" xmlns:v="urn:schemas-microsoft-com:vml" xmlns:o="urn:schemas-microsoft-com:office:office" xmlns:dgm="http://schemas.openxmlformats.org/drawingml/2006/diagram" xmlns:c="http://schemas.openxmlformats.org/drawingml/2006/chart" xmlns:mv="urn:schemas-microsoft-com:mac:vml" xmlns="">
       <p:transition spd="slow">
         <p:fade/>
       </p:transition>
@@ -29685,7 +29685,7 @@
         <p:fade/>
       </p:transition>
     </mc:Choice>
-    <mc:Fallback xmlns="" xmlns:mv="urn:schemas-microsoft-com:mac:vml" xmlns:c="http://schemas.openxmlformats.org/drawingml/2006/chart" xmlns:dgm="http://schemas.openxmlformats.org/drawingml/2006/diagram" xmlns:o="urn:schemas-microsoft-com:office:office" xmlns:v="urn:schemas-microsoft-com:vml" xmlns:pvml="urn:schemas-microsoft-com:office:powerpoint" xmlns:com="http://schemas.openxmlformats.org/drawingml/2006/compatibility" xmlns:p15="http://schemas.microsoft.com/office/powerpoint/2012/main" xmlns:ahyp="http://schemas.microsoft.com/office/drawing/2018/hyperlinkcolor">
+    <mc:Fallback xmlns:ahyp="http://schemas.microsoft.com/office/drawing/2018/hyperlinkcolor" xmlns:p15="http://schemas.microsoft.com/office/powerpoint/2012/main" xmlns:com="http://schemas.openxmlformats.org/drawingml/2006/compatibility" xmlns:pvml="urn:schemas-microsoft-com:office:powerpoint" xmlns:v="urn:schemas-microsoft-com:vml" xmlns:o="urn:schemas-microsoft-com:office:office" xmlns:dgm="http://schemas.openxmlformats.org/drawingml/2006/diagram" xmlns:c="http://schemas.openxmlformats.org/drawingml/2006/chart" xmlns:mv="urn:schemas-microsoft-com:mac:vml" xmlns="">
       <p:transition spd="slow">
         <p:fade/>
       </p:transition>

</xml_diff>

<commit_message>
Correção etapa 5 aula 1
</commit_message>
<xml_diff>
--- a/apresentacoes/Aula1/Etapa1-Apresentacao/Etapa1.pptx
+++ b/apresentacoes/Aula1/Etapa1-Apresentacao/Etapa1.pptx
@@ -22720,8 +22720,8 @@
         </p:blipFill>
         <p:spPr bwMode="auto">
           <a:xfrm>
-            <a:off x="4040392" y="1226250"/>
-            <a:ext cx="4876800" cy="3448050"/>
+            <a:off x="4040392" y="1098657"/>
+            <a:ext cx="3069528" cy="2170252"/>
           </a:xfrm>
           <a:prstGeom prst="rect">
             <a:avLst/>
@@ -24282,16 +24282,13 @@
               </a:rPr>
               <a:t>ListaDuplamenteEncadeada</a:t>
             </a:r>
-            <a:r>
-              <a:rPr lang="pt-BR" sz="2400" dirty="0">
-                <a:solidFill>
-                  <a:srgbClr val="002060"/>
-                </a:solidFill>
-                <a:latin typeface="Calibri" panose="020F0502020204030204" pitchFamily="34" charset="0"/>
-                <a:cs typeface="Calibri" panose="020F0502020204030204" pitchFamily="34" charset="0"/>
-              </a:rPr>
-              <a:t> ()</a:t>
-            </a:r>
+            <a:endParaRPr lang="pt-BR" sz="2400" dirty="0">
+              <a:solidFill>
+                <a:srgbClr val="002060"/>
+              </a:solidFill>
+              <a:latin typeface="Calibri" panose="020F0502020204030204" pitchFamily="34" charset="0"/>
+              <a:cs typeface="Calibri" panose="020F0502020204030204" pitchFamily="34" charset="0"/>
+            </a:endParaRPr>
           </a:p>
           <a:p>
             <a:r>
@@ -24657,16 +24654,13 @@
               </a:rPr>
               <a:t>ListaCircular</a:t>
             </a:r>
-            <a:r>
-              <a:rPr lang="pt-BR" sz="2400" dirty="0">
-                <a:solidFill>
-                  <a:srgbClr val="002060"/>
-                </a:solidFill>
-                <a:latin typeface="Calibri" panose="020F0502020204030204" pitchFamily="34" charset="0"/>
-                <a:cs typeface="Calibri" panose="020F0502020204030204" pitchFamily="34" charset="0"/>
-              </a:rPr>
-              <a:t>()</a:t>
-            </a:r>
+            <a:endParaRPr lang="pt-BR" sz="2400" dirty="0">
+              <a:solidFill>
+                <a:srgbClr val="002060"/>
+              </a:solidFill>
+              <a:latin typeface="Calibri" panose="020F0502020204030204" pitchFamily="34" charset="0"/>
+              <a:cs typeface="Calibri" panose="020F0502020204030204" pitchFamily="34" charset="0"/>
+            </a:endParaRPr>
           </a:p>
           <a:p>
             <a:r>
@@ -24687,7 +24681,7 @@
                 <a:latin typeface="Calibri" panose="020F0502020204030204" pitchFamily="34" charset="0"/>
                 <a:cs typeface="Calibri" panose="020F0502020204030204" pitchFamily="34" charset="0"/>
               </a:rPr>
-              <a:t>ListaEncadeada</a:t>
+              <a:t>ListaCircular</a:t>
             </a:r>
             <a:endParaRPr lang="pt-BR" sz="2400" dirty="0">
               <a:solidFill>
@@ -25619,27 +25613,7 @@
                 <a:latin typeface="Calibri" panose="020F0502020204030204" pitchFamily="34" charset="0"/>
                 <a:cs typeface="Calibri" panose="020F0502020204030204" pitchFamily="34" charset="0"/>
               </a:rPr>
-              <a:t>, </a:t>
-            </a:r>
-            <a:r>
-              <a:rPr lang="pt-BR" sz="2400" dirty="0" err="1">
-                <a:solidFill>
-                  <a:srgbClr val="002060"/>
-                </a:solidFill>
-                <a:latin typeface="Calibri" panose="020F0502020204030204" pitchFamily="34" charset="0"/>
-                <a:cs typeface="Calibri" panose="020F0502020204030204" pitchFamily="34" charset="0"/>
-              </a:rPr>
-              <a:t>LikedList</a:t>
-            </a:r>
-            <a:r>
-              <a:rPr lang="pt-BR" sz="2400" dirty="0">
-                <a:solidFill>
-                  <a:srgbClr val="002060"/>
-                </a:solidFill>
-                <a:latin typeface="Calibri" panose="020F0502020204030204" pitchFamily="34" charset="0"/>
-                <a:cs typeface="Calibri" panose="020F0502020204030204" pitchFamily="34" charset="0"/>
-              </a:rPr>
-              <a:t>, Vector)</a:t>
+              <a:t>)</a:t>
             </a:r>
           </a:p>
           <a:p>
@@ -26516,7 +26490,7 @@
         </p:blipFill>
         <p:spPr>
           <a:xfrm>
-            <a:off x="7196362" y="2461450"/>
+            <a:off x="7196362" y="101010"/>
             <a:ext cx="1938293" cy="2349447"/>
           </a:xfrm>
           <a:prstGeom prst="rect">
@@ -28557,8 +28531,8 @@
         </p:nvSpPr>
         <p:spPr>
           <a:xfrm>
-            <a:off x="733449" y="4376135"/>
-            <a:ext cx="7677102" cy="461665"/>
+            <a:off x="25382" y="4683911"/>
+            <a:ext cx="4568879" cy="307777"/>
           </a:xfrm>
           <a:prstGeom prst="rect">
             <a:avLst/>
@@ -28572,7 +28546,7 @@
           <a:lstStyle/>
           <a:p>
             <a:r>
-              <a:rPr lang="pt-BR" sz="2400" dirty="0">
+              <a:rPr lang="pt-BR" dirty="0">
                 <a:solidFill>
                   <a:srgbClr val="002060"/>
                 </a:solidFill>
@@ -28588,7 +28562,7 @@
               </a:rPr>
               <a:t>https://www.linkedin.com/in/jo%C3%A3o-dutra-400a9330/</a:t>
             </a:r>
-            <a:endParaRPr lang="pt-BR" sz="2400" dirty="0">
+            <a:endParaRPr lang="pt-BR" dirty="0">
               <a:solidFill>
                 <a:srgbClr val="002060"/>
               </a:solidFill>
@@ -28892,7 +28866,7 @@
         </p:blipFill>
         <p:spPr>
           <a:xfrm>
-            <a:off x="5609784" y="1461300"/>
+            <a:off x="3534217" y="1438549"/>
             <a:ext cx="2750857" cy="2750857"/>
           </a:xfrm>
           <a:prstGeom prst="rect">
@@ -28914,7 +28888,7 @@
         </p:nvSpPr>
         <p:spPr>
           <a:xfrm>
-            <a:off x="5609784" y="1076938"/>
+            <a:off x="3534217" y="1054187"/>
             <a:ext cx="2800767" cy="461665"/>
           </a:xfrm>
           <a:prstGeom prst="rect">
@@ -29010,7 +28984,7 @@
         </p:nvSpPr>
         <p:spPr>
           <a:xfrm>
-            <a:off x="6666966" y="4056068"/>
+            <a:off x="4591399" y="4033317"/>
             <a:ext cx="686406" cy="461665"/>
           </a:xfrm>
           <a:prstGeom prst="rect">
@@ -29266,8 +29240,8 @@
         </p:nvSpPr>
         <p:spPr>
           <a:xfrm>
-            <a:off x="460137" y="4438821"/>
-            <a:ext cx="8223726" cy="461665"/>
+            <a:off x="36798" y="4674558"/>
+            <a:ext cx="5543505" cy="338554"/>
           </a:xfrm>
           <a:prstGeom prst="rect">
             <a:avLst/>
@@ -29281,7 +29255,7 @@
           <a:lstStyle/>
           <a:p>
             <a:r>
-              <a:rPr lang="pt-BR" sz="2400" dirty="0">
+              <a:rPr lang="pt-BR" sz="1600" dirty="0">
                 <a:solidFill>
                   <a:srgbClr val="002060"/>
                 </a:solidFill>
@@ -29297,7 +29271,7 @@
               </a:rPr>
               <a:t>https://www.youtube.com/channel/UCj1AuxI-1Y-sK19nJEpcb3Q</a:t>
             </a:r>
-            <a:endParaRPr lang="pt-BR" sz="2400" dirty="0">
+            <a:endParaRPr lang="pt-BR" sz="1600" dirty="0">
               <a:solidFill>
                 <a:srgbClr val="002060"/>
               </a:solidFill>
@@ -29567,7 +29541,7 @@
         </p:blipFill>
         <p:spPr bwMode="auto">
           <a:xfrm>
-            <a:off x="3258441" y="995655"/>
+            <a:off x="311700" y="983693"/>
             <a:ext cx="2552397" cy="3612830"/>
           </a:xfrm>
           <a:prstGeom prst="rect">
@@ -29616,8 +29590,8 @@
         </p:blipFill>
         <p:spPr>
           <a:xfrm>
-            <a:off x="372338" y="995655"/>
-            <a:ext cx="2465972" cy="3592998"/>
+            <a:off x="2982351" y="992621"/>
+            <a:ext cx="1598884" cy="2329624"/>
           </a:xfrm>
           <a:prstGeom prst="rect">
             <a:avLst/>
@@ -29656,8 +29630,8 @@
         </p:blipFill>
         <p:spPr>
           <a:xfrm>
-            <a:off x="6161650" y="992621"/>
-            <a:ext cx="2561451" cy="3603902"/>
+            <a:off x="4699489" y="992621"/>
+            <a:ext cx="1628687" cy="2291525"/>
           </a:xfrm>
           <a:prstGeom prst="rect">
             <a:avLst/>

</xml_diff>